<commit_message>
placed the two maps vertically
</commit_message>
<xml_diff>
--- a/Presentation/Presentation1.pptx
+++ b/Presentation/Presentation1.pptx
@@ -6,11 +6,13 @@
   </p:sldMasterIdLst>
   <p:sldIdLst>
     <p:sldId id="256" r:id="rId2"/>
-    <p:sldId id="258" r:id="rId3"/>
-    <p:sldId id="259" r:id="rId4"/>
-    <p:sldId id="260" r:id="rId5"/>
-    <p:sldId id="261" r:id="rId6"/>
-    <p:sldId id="257" r:id="rId7"/>
+    <p:sldId id="262" r:id="rId3"/>
+    <p:sldId id="263" r:id="rId4"/>
+    <p:sldId id="258" r:id="rId5"/>
+    <p:sldId id="259" r:id="rId6"/>
+    <p:sldId id="260" r:id="rId7"/>
+    <p:sldId id="261" r:id="rId8"/>
+    <p:sldId id="257" r:id="rId9"/>
   </p:sldIdLst>
   <p:sldSz cx="12192000" cy="6858000"/>
   <p:notesSz cx="6858000" cy="9144000"/>
@@ -3062,7 +3064,7 @@
       </p:grpSpPr>
       <p:pic>
         <p:nvPicPr>
-          <p:cNvPr id="3" name="Picture 2"/>
+          <p:cNvPr id="2" name="Picture 1"/>
           <p:cNvPicPr>
             <a:picLocks noChangeAspect="1"/>
           </p:cNvPicPr>
@@ -3087,7 +3089,7 @@
     </p:spTree>
     <p:extLst>
       <p:ext uri="{BB962C8B-B14F-4D97-AF65-F5344CB8AC3E}">
-        <p14:creationId xmlns:p14="http://schemas.microsoft.com/office/powerpoint/2010/main" val="102445838"/>
+        <p14:creationId xmlns:p14="http://schemas.microsoft.com/office/powerpoint/2010/main" val="3924070944"/>
       </p:ext>
     </p:extLst>
   </p:cSld>
@@ -3148,6 +3150,128 @@
     </p:spTree>
     <p:extLst>
       <p:ext uri="{BB962C8B-B14F-4D97-AF65-F5344CB8AC3E}">
+        <p14:creationId xmlns:p14="http://schemas.microsoft.com/office/powerpoint/2010/main" val="1720226781"/>
+      </p:ext>
+    </p:extLst>
+  </p:cSld>
+  <p:clrMapOvr>
+    <a:masterClrMapping/>
+  </p:clrMapOvr>
+  <p:timing>
+    <p:tnLst>
+      <p:par>
+        <p:cTn id="1" dur="indefinite" restart="never" nodeType="tmRoot"/>
+      </p:par>
+    </p:tnLst>
+  </p:timing>
+</p:sld>
+</file>
+
+<file path=ppt/slides/slide4.xml><?xml version="1.0" encoding="utf-8"?>
+<p:sld xmlns:a="http://schemas.openxmlformats.org/drawingml/2006/main" xmlns:r="http://schemas.openxmlformats.org/officeDocument/2006/relationships" xmlns:p="http://schemas.openxmlformats.org/presentationml/2006/main">
+  <p:cSld>
+    <p:spTree>
+      <p:nvGrpSpPr>
+        <p:cNvPr id="1" name=""/>
+        <p:cNvGrpSpPr/>
+        <p:nvPr/>
+      </p:nvGrpSpPr>
+      <p:grpSpPr>
+        <a:xfrm>
+          <a:off x="0" y="0"/>
+          <a:ext cx="0" cy="0"/>
+          <a:chOff x="0" y="0"/>
+          <a:chExt cx="0" cy="0"/>
+        </a:xfrm>
+      </p:grpSpPr>
+      <p:pic>
+        <p:nvPicPr>
+          <p:cNvPr id="3" name="Picture 2"/>
+          <p:cNvPicPr>
+            <a:picLocks noChangeAspect="1"/>
+          </p:cNvPicPr>
+          <p:nvPr/>
+        </p:nvPicPr>
+        <p:blipFill>
+          <a:blip r:embed="rId2"/>
+          <a:stretch>
+            <a:fillRect/>
+          </a:stretch>
+        </p:blipFill>
+        <p:spPr>
+          <a:xfrm>
+            <a:off x="0" y="1673"/>
+            <a:ext cx="12192000" cy="6854653"/>
+          </a:xfrm>
+          <a:prstGeom prst="rect">
+            <a:avLst/>
+          </a:prstGeom>
+        </p:spPr>
+      </p:pic>
+    </p:spTree>
+    <p:extLst>
+      <p:ext uri="{BB962C8B-B14F-4D97-AF65-F5344CB8AC3E}">
+        <p14:creationId xmlns:p14="http://schemas.microsoft.com/office/powerpoint/2010/main" val="102445838"/>
+      </p:ext>
+    </p:extLst>
+  </p:cSld>
+  <p:clrMapOvr>
+    <a:masterClrMapping/>
+  </p:clrMapOvr>
+  <p:timing>
+    <p:tnLst>
+      <p:par>
+        <p:cTn id="1" dur="indefinite" restart="never" nodeType="tmRoot"/>
+      </p:par>
+    </p:tnLst>
+  </p:timing>
+</p:sld>
+</file>
+
+<file path=ppt/slides/slide5.xml><?xml version="1.0" encoding="utf-8"?>
+<p:sld xmlns:a="http://schemas.openxmlformats.org/drawingml/2006/main" xmlns:r="http://schemas.openxmlformats.org/officeDocument/2006/relationships" xmlns:p="http://schemas.openxmlformats.org/presentationml/2006/main">
+  <p:cSld>
+    <p:spTree>
+      <p:nvGrpSpPr>
+        <p:cNvPr id="1" name=""/>
+        <p:cNvGrpSpPr/>
+        <p:nvPr/>
+      </p:nvGrpSpPr>
+      <p:grpSpPr>
+        <a:xfrm>
+          <a:off x="0" y="0"/>
+          <a:ext cx="0" cy="0"/>
+          <a:chOff x="0" y="0"/>
+          <a:chExt cx="0" cy="0"/>
+        </a:xfrm>
+      </p:grpSpPr>
+      <p:pic>
+        <p:nvPicPr>
+          <p:cNvPr id="5" name="Picture 4"/>
+          <p:cNvPicPr>
+            <a:picLocks noChangeAspect="1"/>
+          </p:cNvPicPr>
+          <p:nvPr/>
+        </p:nvPicPr>
+        <p:blipFill>
+          <a:blip r:embed="rId2"/>
+          <a:stretch>
+            <a:fillRect/>
+          </a:stretch>
+        </p:blipFill>
+        <p:spPr>
+          <a:xfrm>
+            <a:off x="0" y="1673"/>
+            <a:ext cx="12192000" cy="6854653"/>
+          </a:xfrm>
+          <a:prstGeom prst="rect">
+            <a:avLst/>
+          </a:prstGeom>
+        </p:spPr>
+      </p:pic>
+    </p:spTree>
+    <p:extLst>
+      <p:ext uri="{BB962C8B-B14F-4D97-AF65-F5344CB8AC3E}">
         <p14:creationId xmlns:p14="http://schemas.microsoft.com/office/powerpoint/2010/main" val="2169209199"/>
       </p:ext>
     </p:extLst>
@@ -3165,7 +3289,7 @@
 </p:sld>
 </file>
 
-<file path=ppt/slides/slide4.xml><?xml version="1.0" encoding="utf-8"?>
+<file path=ppt/slides/slide6.xml><?xml version="1.0" encoding="utf-8"?>
 <p:sld xmlns:a="http://schemas.openxmlformats.org/drawingml/2006/main" xmlns:r="http://schemas.openxmlformats.org/officeDocument/2006/relationships" xmlns:p="http://schemas.openxmlformats.org/presentationml/2006/main">
   <p:cSld>
     <p:spTree>
@@ -3226,7 +3350,7 @@
 </p:sld>
 </file>
 
-<file path=ppt/slides/slide5.xml><?xml version="1.0" encoding="utf-8"?>
+<file path=ppt/slides/slide7.xml><?xml version="1.0" encoding="utf-8"?>
 <p:sld xmlns:a="http://schemas.openxmlformats.org/drawingml/2006/main" xmlns:r="http://schemas.openxmlformats.org/officeDocument/2006/relationships" xmlns:p="http://schemas.openxmlformats.org/presentationml/2006/main">
   <p:cSld>
     <p:spTree>
@@ -3259,8 +3383,8 @@
         </p:blipFill>
         <p:spPr>
           <a:xfrm>
-            <a:off x="-96253" y="1673"/>
-            <a:ext cx="12288253" cy="6854653"/>
+            <a:off x="6096000" y="1673"/>
+            <a:ext cx="6096000" cy="6854653"/>
           </a:xfrm>
           <a:prstGeom prst="rect">
             <a:avLst/>
@@ -3287,7 +3411,7 @@
 </p:sld>
 </file>
 
-<file path=ppt/slides/slide6.xml><?xml version="1.0" encoding="utf-8"?>
+<file path=ppt/slides/slide8.xml><?xml version="1.0" encoding="utf-8"?>
 <p:sld xmlns:a="http://schemas.openxmlformats.org/drawingml/2006/main" xmlns:r="http://schemas.openxmlformats.org/officeDocument/2006/relationships" xmlns:p="http://schemas.openxmlformats.org/presentationml/2006/main">
   <p:cSld>
     <p:spTree>

</xml_diff>